<commit_message>
docs; Hoàn thành slot 5
</commit_message>
<xml_diff>
--- a/slides/Chapter 03/3.2 The Apriori Algorithm.pptx
+++ b/slides/Chapter 03/3.2 The Apriori Algorithm.pptx
@@ -2602,8 +2602,8 @@
         </p:nvSpPr>
         <p:spPr>
           <a:xfrm>
-            <a:off x="429100" y="687314"/>
-            <a:ext cx="6001500" cy="3427500"/>
+            <a:off x="384175" y="687388"/>
+            <a:ext cx="6091238" cy="3427412"/>
           </a:xfrm>
           <a:custGeom>
             <a:avLst/>
@@ -25952,14 +25952,46 @@
               <a:buChar char="●"/>
             </a:pPr>
             <a:r>
-              <a:rPr lang="en-GB" sz="1800">
+              <a:rPr lang="en-GB" sz="1800" dirty="0">
                 <a:solidFill>
                   <a:srgbClr val="1F1F1F"/>
                 </a:solidFill>
               </a:rPr>
-              <a:t>The Apriori algorithm is a classic algorithm used for mining frequent itemsets.</a:t>
+              <a:t>The </a:t>
             </a:r>
-            <a:endParaRPr sz="1800">
+            <a:r>
+              <a:rPr lang="en-GB" sz="1800" dirty="0" err="1">
+                <a:solidFill>
+                  <a:srgbClr val="1F1F1F"/>
+                </a:solidFill>
+              </a:rPr>
+              <a:t>Apriori</a:t>
+            </a:r>
+            <a:r>
+              <a:rPr lang="en-GB" sz="1800" dirty="0">
+                <a:solidFill>
+                  <a:srgbClr val="1F1F1F"/>
+                </a:solidFill>
+              </a:rPr>
+              <a:t> algorithm is a classic algorithm used for mining frequent </a:t>
+            </a:r>
+            <a:r>
+              <a:rPr lang="en-GB" sz="1800" dirty="0" err="1">
+                <a:solidFill>
+                  <a:srgbClr val="1F1F1F"/>
+                </a:solidFill>
+              </a:rPr>
+              <a:t>itemsets</a:t>
+            </a:r>
+            <a:r>
+              <a:rPr lang="en-GB" sz="1800" dirty="0">
+                <a:solidFill>
+                  <a:srgbClr val="1F1F1F"/>
+                </a:solidFill>
+              </a:rPr>
+              <a:t>.</a:t>
+            </a:r>
+            <a:endParaRPr sz="1800" dirty="0">
               <a:solidFill>
                 <a:srgbClr val="1F1F1F"/>
               </a:solidFill>
@@ -25984,14 +26016,14 @@
               <a:buChar char="●"/>
             </a:pPr>
             <a:r>
-              <a:rPr lang="en-GB" sz="1800">
+              <a:rPr lang="en-GB" sz="1800" dirty="0">
                 <a:solidFill>
                   <a:srgbClr val="1F1F1F"/>
                 </a:solidFill>
               </a:rPr>
               <a:t>It is based on the observation that if an itemset is frequent, then all of its subsets must also be frequent.</a:t>
             </a:r>
-            <a:endParaRPr sz="1800">
+            <a:endParaRPr sz="1800" dirty="0">
               <a:solidFill>
                 <a:srgbClr val="1F1F1F"/>
               </a:solidFill>
@@ -26016,14 +26048,30 @@
               <a:buChar char="●"/>
             </a:pPr>
             <a:r>
-              <a:rPr lang="en-GB" sz="1800">
+              <a:rPr lang="en-GB" sz="1800" dirty="0">
                 <a:solidFill>
                   <a:srgbClr val="1F1F1F"/>
                 </a:solidFill>
               </a:rPr>
-              <a:t>The algorithm aims to find all frequent itemsets in a transactional dataset.</a:t>
+              <a:t>The algorithm aims to find all frequent </a:t>
             </a:r>
-            <a:endParaRPr sz="1800">
+            <a:r>
+              <a:rPr lang="en-GB" sz="1800" dirty="0" err="1">
+                <a:solidFill>
+                  <a:srgbClr val="1F1F1F"/>
+                </a:solidFill>
+              </a:rPr>
+              <a:t>itemsets</a:t>
+            </a:r>
+            <a:r>
+              <a:rPr lang="en-GB" sz="1800" dirty="0">
+                <a:solidFill>
+                  <a:srgbClr val="1F1F1F"/>
+                </a:solidFill>
+              </a:rPr>
+              <a:t> in a transactional dataset.</a:t>
+            </a:r>
+            <a:endParaRPr sz="1800" dirty="0">
               <a:solidFill>
                 <a:srgbClr val="1F1F1F"/>
               </a:solidFill>
@@ -27418,14 +27466,14 @@
               <a:buChar char="●"/>
             </a:pPr>
             <a:r>
-              <a:rPr lang="en-GB" sz="1800">
+              <a:rPr lang="en-GB" sz="1800" dirty="0">
                 <a:solidFill>
                   <a:srgbClr val="1F1F1F"/>
                 </a:solidFill>
               </a:rPr>
               <a:t>Simplicity: The algorithm is straightforward and easy to understand and implement.</a:t>
             </a:r>
-            <a:endParaRPr sz="1800">
+            <a:endParaRPr sz="1800" dirty="0">
               <a:solidFill>
                 <a:srgbClr val="1F1F1F"/>
               </a:solidFill>
@@ -27450,14 +27498,14 @@
               <a:buChar char="●"/>
             </a:pPr>
             <a:r>
-              <a:rPr lang="en-GB" sz="1800">
+              <a:rPr lang="en-GB" sz="1800" dirty="0">
                 <a:solidFill>
                   <a:srgbClr val="1F1F1F"/>
                 </a:solidFill>
               </a:rPr>
               <a:t>Scalability: It can handle large datasets efficiently by utilizing the downward closure property.</a:t>
             </a:r>
-            <a:endParaRPr sz="1800">
+            <a:endParaRPr sz="1800" dirty="0">
               <a:solidFill>
                 <a:srgbClr val="1F1F1F"/>
               </a:solidFill>
@@ -27482,14 +27530,46 @@
               <a:buChar char="●"/>
             </a:pPr>
             <a:r>
-              <a:rPr lang="en-GB" sz="1800">
+              <a:rPr lang="en-GB" sz="1800" dirty="0">
                 <a:solidFill>
                   <a:srgbClr val="1F1F1F"/>
                 </a:solidFill>
               </a:rPr>
-              <a:t>Completeness: The Apriori algorithm guarantees to find all frequent itemsets.</a:t>
+              <a:t>Completeness: The </a:t>
             </a:r>
-            <a:endParaRPr sz="1800">
+            <a:r>
+              <a:rPr lang="en-GB" sz="1800" dirty="0" err="1">
+                <a:solidFill>
+                  <a:srgbClr val="1F1F1F"/>
+                </a:solidFill>
+              </a:rPr>
+              <a:t>Apriori</a:t>
+            </a:r>
+            <a:r>
+              <a:rPr lang="en-GB" sz="1800" dirty="0">
+                <a:solidFill>
+                  <a:srgbClr val="1F1F1F"/>
+                </a:solidFill>
+              </a:rPr>
+              <a:t> algorithm guarantees to find all frequent </a:t>
+            </a:r>
+            <a:r>
+              <a:rPr lang="en-GB" sz="1800" dirty="0" err="1">
+                <a:solidFill>
+                  <a:srgbClr val="1F1F1F"/>
+                </a:solidFill>
+              </a:rPr>
+              <a:t>itemsets</a:t>
+            </a:r>
+            <a:r>
+              <a:rPr lang="en-GB" sz="1800" dirty="0">
+                <a:solidFill>
+                  <a:srgbClr val="1F1F1F"/>
+                </a:solidFill>
+              </a:rPr>
+              <a:t>.</a:t>
+            </a:r>
+            <a:endParaRPr sz="1800" dirty="0">
               <a:solidFill>
                 <a:srgbClr val="1F1F1F"/>
               </a:solidFill>
@@ -27620,7 +27700,7 @@
               <a:buNone/>
             </a:pPr>
             <a:r>
-              <a:rPr lang="en-GB" sz="1800" b="1" i="1">
+              <a:rPr lang="en-GB" sz="1800" b="1" i="1" dirty="0">
                 <a:solidFill>
                   <a:srgbClr val="0B5394"/>
                 </a:solidFill>
@@ -27629,9 +27709,33 @@
                 <a:cs typeface="Times New Roman"/>
                 <a:sym typeface="Times New Roman"/>
               </a:rPr>
-              <a:t>Strengths of the Apriori Algorithm</a:t>
+              <a:t>Strengths of the </a:t>
             </a:r>
-            <a:endParaRPr sz="1200">
+            <a:r>
+              <a:rPr lang="en-GB" sz="1800" b="1" i="1" dirty="0" err="1">
+                <a:solidFill>
+                  <a:srgbClr val="0B5394"/>
+                </a:solidFill>
+                <a:latin typeface="Times New Roman"/>
+                <a:ea typeface="Times New Roman"/>
+                <a:cs typeface="Times New Roman"/>
+                <a:sym typeface="Times New Roman"/>
+              </a:rPr>
+              <a:t>Apriori</a:t>
+            </a:r>
+            <a:r>
+              <a:rPr lang="en-GB" sz="1800" b="1" i="1" dirty="0">
+                <a:solidFill>
+                  <a:srgbClr val="0B5394"/>
+                </a:solidFill>
+                <a:latin typeface="Times New Roman"/>
+                <a:ea typeface="Times New Roman"/>
+                <a:cs typeface="Times New Roman"/>
+                <a:sym typeface="Times New Roman"/>
+              </a:rPr>
+              <a:t> Algorithm</a:t>
+            </a:r>
+            <a:endParaRPr sz="1200" dirty="0">
               <a:solidFill>
                 <a:srgbClr val="374151"/>
               </a:solidFill>
@@ -27657,7 +27761,7 @@
               </a:spcAft>
               <a:buNone/>
             </a:pPr>
-            <a:endParaRPr sz="1800" b="1" i="1">
+            <a:endParaRPr sz="1800" b="1" i="1" dirty="0">
               <a:solidFill>
                 <a:srgbClr val="0B5394"/>
               </a:solidFill>
@@ -27777,16 +27881,13 @@
           </a:bodyPr>
           <a:lstStyle/>
           <a:p>
-            <a:pPr marL="342900" lvl="0" indent="-350520" algn="l" rtl="0">
+            <a:pPr marL="342900" indent="-350520">
               <a:lnSpc>
                 <a:spcPct val="115000"/>
               </a:lnSpc>
               <a:spcBef>
                 <a:spcPts val="1500"/>
               </a:spcBef>
-              <a:spcAft>
-                <a:spcPts val="0"/>
-              </a:spcAft>
               <a:buClr>
                 <a:srgbClr val="374151"/>
               </a:buClr>
@@ -27795,14 +27896,30 @@
               <a:buChar char="●"/>
             </a:pPr>
             <a:r>
-              <a:rPr lang="en-GB" sz="1800">
-                <a:solidFill>
-                  <a:srgbClr val="1F1F1F"/>
+              <a:rPr lang="en-GB" sz="1800" b="1" i="1" dirty="0">
+                <a:solidFill>
+                  <a:srgbClr val="0B5394"/>
                 </a:solidFill>
               </a:rPr>
-              <a:t>Computational Cost: Generating a large number of candidate itemsets and scanning the dataset multiple times can be computationally expensive.</a:t>
+              <a:t>Weaknesses  of the </a:t>
             </a:r>
-            <a:endParaRPr sz="1800">
+            <a:r>
+              <a:rPr lang="en-GB" sz="1800" b="1" i="1" dirty="0" err="1">
+                <a:solidFill>
+                  <a:srgbClr val="0B5394"/>
+                </a:solidFill>
+              </a:rPr>
+              <a:t>Apriori</a:t>
+            </a:r>
+            <a:r>
+              <a:rPr lang="en-GB" sz="1800" b="1" i="1" dirty="0">
+                <a:solidFill>
+                  <a:srgbClr val="0B5394"/>
+                </a:solidFill>
+              </a:rPr>
+              <a:t> Algorithm</a:t>
+            </a:r>
+            <a:endParaRPr lang="en-GB" sz="1800" dirty="0">
               <a:solidFill>
                 <a:srgbClr val="1F1F1F"/>
               </a:solidFill>
@@ -27814,7 +27931,7 @@
                 <a:spcPct val="115000"/>
               </a:lnSpc>
               <a:spcBef>
-                <a:spcPts val="0"/>
+                <a:spcPts val="1500"/>
               </a:spcBef>
               <a:spcAft>
                 <a:spcPts val="0"/>
@@ -27827,14 +27944,30 @@
               <a:buChar char="●"/>
             </a:pPr>
             <a:r>
-              <a:rPr lang="en-GB" sz="1800">
+              <a:rPr lang="en-GB" sz="1800" dirty="0">
                 <a:solidFill>
                   <a:srgbClr val="1F1F1F"/>
                 </a:solidFill>
               </a:rPr>
-              <a:t>Memory Usage: The algorithm requires substantial memory to store candidate itemsets and support counts.</a:t>
+              <a:t>Computational Cost: Generating a large number of candidate </a:t>
             </a:r>
-            <a:endParaRPr sz="1800">
+            <a:r>
+              <a:rPr lang="en-GB" sz="1800" dirty="0" err="1">
+                <a:solidFill>
+                  <a:srgbClr val="1F1F1F"/>
+                </a:solidFill>
+              </a:rPr>
+              <a:t>itemsets</a:t>
+            </a:r>
+            <a:r>
+              <a:rPr lang="en-GB" sz="1800" dirty="0">
+                <a:solidFill>
+                  <a:srgbClr val="1F1F1F"/>
+                </a:solidFill>
+              </a:rPr>
+              <a:t> and scanning the dataset multiple times can be computationally expensive.</a:t>
+            </a:r>
+            <a:endParaRPr sz="1800" dirty="0">
               <a:solidFill>
                 <a:srgbClr val="1F1F1F"/>
               </a:solidFill>
@@ -27859,14 +27992,78 @@
               <a:buChar char="●"/>
             </a:pPr>
             <a:r>
-              <a:rPr lang="en-GB" sz="1800">
+              <a:rPr lang="en-GB" sz="1800" dirty="0">
                 <a:solidFill>
                   <a:srgbClr val="1F1F1F"/>
                 </a:solidFill>
               </a:rPr>
-              <a:t>Inefficiency with Sparse Data: In datasets with low support thresholds or sparse itemsets, the algorithm may perform inefficiently.</a:t>
+              <a:t>Memory Usage: The algorithm requires substantial memory to store candidate </a:t>
             </a:r>
-            <a:endParaRPr sz="1800">
+            <a:r>
+              <a:rPr lang="en-GB" sz="1800" dirty="0" err="1">
+                <a:solidFill>
+                  <a:srgbClr val="1F1F1F"/>
+                </a:solidFill>
+              </a:rPr>
+              <a:t>itemsets</a:t>
+            </a:r>
+            <a:r>
+              <a:rPr lang="en-GB" sz="1800" dirty="0">
+                <a:solidFill>
+                  <a:srgbClr val="1F1F1F"/>
+                </a:solidFill>
+              </a:rPr>
+              <a:t> and support counts.</a:t>
+            </a:r>
+            <a:endParaRPr sz="1800" dirty="0">
+              <a:solidFill>
+                <a:srgbClr val="1F1F1F"/>
+              </a:solidFill>
+            </a:endParaRPr>
+          </a:p>
+          <a:p>
+            <a:pPr marL="342900" lvl="0" indent="-350520" algn="l" rtl="0">
+              <a:lnSpc>
+                <a:spcPct val="115000"/>
+              </a:lnSpc>
+              <a:spcBef>
+                <a:spcPts val="0"/>
+              </a:spcBef>
+              <a:spcAft>
+                <a:spcPts val="0"/>
+              </a:spcAft>
+              <a:buClr>
+                <a:srgbClr val="374151"/>
+              </a:buClr>
+              <a:buSzPts val="1200"/>
+              <a:buFont typeface="Roboto"/>
+              <a:buChar char="●"/>
+            </a:pPr>
+            <a:r>
+              <a:rPr lang="en-GB" sz="1800" dirty="0">
+                <a:solidFill>
+                  <a:srgbClr val="1F1F1F"/>
+                </a:solidFill>
+              </a:rPr>
+              <a:t>Inefficiency with Sparse Data: In datasets with low support thresholds or sparse </a:t>
+            </a:r>
+            <a:r>
+              <a:rPr lang="en-GB" sz="1800" dirty="0" err="1">
+                <a:solidFill>
+                  <a:srgbClr val="1F1F1F"/>
+                </a:solidFill>
+              </a:rPr>
+              <a:t>itemsets</a:t>
+            </a:r>
+            <a:r>
+              <a:rPr lang="en-GB" sz="1800" dirty="0">
+                <a:solidFill>
+                  <a:srgbClr val="1F1F1F"/>
+                </a:solidFill>
+              </a:rPr>
+              <a:t>, the algorithm may perform inefficiently.</a:t>
+            </a:r>
+            <a:endParaRPr sz="1800" dirty="0">
               <a:solidFill>
                 <a:srgbClr val="1F1F1F"/>
               </a:solidFill>
@@ -27956,93 +28153,6 @@
               <a:t>8</a:t>
             </a:fld>
             <a:endParaRPr/>
-          </a:p>
-        </p:txBody>
-      </p:sp>
-      <p:sp>
-        <p:nvSpPr>
-          <p:cNvPr id="304" name="Google Shape;304;p30"/>
-          <p:cNvSpPr txBox="1"/>
-          <p:nvPr/>
-        </p:nvSpPr>
-        <p:spPr>
-          <a:xfrm>
-            <a:off x="762000" y="1184875"/>
-            <a:ext cx="4197600" cy="795300"/>
-          </a:xfrm>
-          <a:prstGeom prst="rect">
-            <a:avLst/>
-          </a:prstGeom>
-          <a:noFill/>
-          <a:ln>
-            <a:noFill/>
-          </a:ln>
-        </p:spPr>
-        <p:txBody>
-          <a:bodyPr spcFirstLastPara="1" wrap="square" lIns="91425" tIns="91425" rIns="91425" bIns="91425" anchor="t" anchorCtr="0">
-            <a:spAutoFit/>
-          </a:bodyPr>
-          <a:lstStyle/>
-          <a:p>
-            <a:pPr marL="0" marR="0" lvl="0" indent="0" algn="just" rtl="0">
-              <a:lnSpc>
-                <a:spcPct val="100000"/>
-              </a:lnSpc>
-              <a:spcBef>
-                <a:spcPts val="440"/>
-              </a:spcBef>
-              <a:spcAft>
-                <a:spcPts val="0"/>
-              </a:spcAft>
-              <a:buNone/>
-            </a:pPr>
-            <a:r>
-              <a:rPr lang="en-GB" sz="1800" b="1" i="1">
-                <a:solidFill>
-                  <a:srgbClr val="0B5394"/>
-                </a:solidFill>
-                <a:latin typeface="Times New Roman"/>
-                <a:ea typeface="Times New Roman"/>
-                <a:cs typeface="Times New Roman"/>
-                <a:sym typeface="Times New Roman"/>
-              </a:rPr>
-              <a:t>Weaknesses  of the Apriori Algorithm</a:t>
-            </a:r>
-            <a:endParaRPr sz="1200">
-              <a:solidFill>
-                <a:srgbClr val="374151"/>
-              </a:solidFill>
-              <a:highlight>
-                <a:srgbClr val="F7F7F8"/>
-              </a:highlight>
-              <a:latin typeface="Roboto"/>
-              <a:ea typeface="Roboto"/>
-              <a:cs typeface="Roboto"/>
-              <a:sym typeface="Roboto"/>
-            </a:endParaRPr>
-          </a:p>
-          <a:p>
-            <a:pPr marL="0" marR="0" lvl="0" indent="0" algn="just" rtl="0">
-              <a:lnSpc>
-                <a:spcPct val="100000"/>
-              </a:lnSpc>
-              <a:spcBef>
-                <a:spcPts val="440"/>
-              </a:spcBef>
-              <a:spcAft>
-                <a:spcPts val="0"/>
-              </a:spcAft>
-              <a:buNone/>
-            </a:pPr>
-            <a:endParaRPr sz="1800" b="1" i="1">
-              <a:solidFill>
-                <a:srgbClr val="0B5394"/>
-              </a:solidFill>
-              <a:latin typeface="Times New Roman"/>
-              <a:ea typeface="Times New Roman"/>
-              <a:cs typeface="Times New Roman"/>
-              <a:sym typeface="Times New Roman"/>
-            </a:endParaRPr>
           </a:p>
         </p:txBody>
       </p:sp>

</xml_diff>